<commit_message>
Jeszcze jedna wersja prezentacji
</commit_message>
<xml_diff>
--- a/src/main/resources/prezentacja/Car Rent 71 - prezentacja.pptx
+++ b/src/main/resources/prezentacja/Car Rent 71 - prezentacja.pptx
@@ -4429,11 +4429,7 @@
           <a:p>
             <a:r>
               <a:rPr lang="pl-PL" dirty="0" smtClean="0"/>
-              <a:t>Brak </a:t>
-            </a:r>
-            <a:r>
-              <a:rPr lang="pl-PL" dirty="0" smtClean="0"/>
-              <a:t>logowania</a:t>
+              <a:t>Brak logowania</a:t>
             </a:r>
           </a:p>
           <a:p>
@@ -4697,7 +4693,17 @@
             </a:r>
             <a:r>
               <a:rPr lang="pl-PL" dirty="0" smtClean="0"/>
-              <a:t> Panel</a:t>
+              <a:t> </a:t>
+            </a:r>
+            <a:r>
+              <a:rPr lang="pl-PL" dirty="0" smtClean="0"/>
+              <a:t>Panel</a:t>
+            </a:r>
+          </a:p>
+          <a:p>
+            <a:r>
+              <a:rPr lang="pl-PL" dirty="0" err="1" smtClean="0"/>
+              <a:t>Aspose</a:t>
             </a:r>
             <a:endParaRPr lang="pl-PL" dirty="0"/>
           </a:p>

</xml_diff>